<commit_message>
Groupdocs.Assembly 25.12 December Christmas Release update
</commit_message>
<xml_diff>
--- a/Examples/Data/Artifacts/AssemblePresentationFromJson.pptx
+++ b/Examples/Data/Artifacts/AssemblePresentationFromJson.pptx
@@ -3207,7 +3207,7 @@
           <a:p>
             <a:pPr algn="ctr"/>
             <a:r>
-              <a:t>Created with GroupDocs.Assembly 25.6.</a:t>
+              <a:t>Created with GroupDocs.Assembly 25.12.</a:t>
             </a:r>
           </a:p>
           <a:p>
@@ -3241,10 +3241,10 @@
 
 <file path=ppt/tags/tag1.xml><?xml version="1.0" encoding="utf-8"?>
 <p:tagLst xmlns:p="http://schemas.openxmlformats.org/presentationml/2006/main">
-  <p:tag name="AS_NET" val="6.0.36"/>
-  <p:tag name="AS_OS" val="Microsoft Windows NT 10.0.26100.0"/>
+  <p:tag name="AS_NET" val="4.0.30319.42000"/>
+  <p:tag name="AS_OS" val="Microsoft Windows NT 6.2.9200.0"/>
   <p:tag name="AS_RELEASE_DATE" val="2024.05.14"/>
-  <p:tag name="AS_TITLE" val="Aspose.Slides for .NET Standard 2.0"/>
+  <p:tag name="AS_TITLE" val="Aspose.Slides for .NET 4.0 Client Profile"/>
   <p:tag name="AS_VERSION" val="24.5"/>
 </p:tagLst>
 </file>

</xml_diff>